<commit_message>
Add a graph for the regions
</commit_message>
<xml_diff>
--- a/EDApre.pptx
+++ b/EDApre.pptx
@@ -7,15 +7,16 @@
   <p:sldIdLst>
     <p:sldId id="257" r:id="rId3"/>
     <p:sldId id="262" r:id="rId4"/>
-    <p:sldId id="258" r:id="rId5"/>
-    <p:sldId id="259" r:id="rId6"/>
-    <p:sldId id="260" r:id="rId7"/>
-    <p:sldId id="261" r:id="rId8"/>
+    <p:sldId id="267" r:id="rId5"/>
+    <p:sldId id="258" r:id="rId6"/>
+    <p:sldId id="259" r:id="rId7"/>
+    <p:sldId id="260" r:id="rId8"/>
+    <p:sldId id="261" r:id="rId9"/>
   </p:sldIdLst>
   <p:sldSz cx="12192000" cy="6858000"/>
   <p:notesSz cx="6858000" cy="9144000"/>
   <p:custDataLst>
-    <p:tags r:id="rId12"/>
+    <p:tags r:id="rId13"/>
   </p:custDataLst>
   <p:defaultTextStyle>
     <a:defPPr>
@@ -3123,6 +3124,114 @@
         <p:nvPr/>
       </p:nvGrpSpPr>
       <p:grpSpPr/>
+      <p:sp>
+        <p:nvSpPr>
+          <p:cNvPr id="2" name="标题 1"/>
+          <p:cNvSpPr>
+            <a:spLocks noGrp="1"/>
+          </p:cNvSpPr>
+          <p:nvPr>
+            <p:ph type="title"/>
+          </p:nvPr>
+        </p:nvSpPr>
+        <p:spPr/>
+        <p:txBody>
+          <a:bodyPr/>
+          <a:p>
+            <a:endParaRPr lang="zh-CN" altLang="en-US"/>
+          </a:p>
+        </p:txBody>
+      </p:sp>
+      <p:sp>
+        <p:nvSpPr>
+          <p:cNvPr id="5" name="矩形 4"/>
+          <p:cNvSpPr/>
+          <p:nvPr/>
+        </p:nvSpPr>
+        <p:spPr>
+          <a:xfrm>
+            <a:off x="7263130" y="5773420"/>
+            <a:ext cx="1450975" cy="412115"/>
+          </a:xfrm>
+          <a:prstGeom prst="rect">
+            <a:avLst/>
+          </a:prstGeom>
+          <a:solidFill>
+            <a:schemeClr val="bg1"/>
+          </a:solidFill>
+          <a:ln>
+            <a:noFill/>
+          </a:ln>
+        </p:spPr>
+        <p:style>
+          <a:lnRef idx="2">
+            <a:schemeClr val="accent1">
+              <a:lumMod val="75000"/>
+            </a:schemeClr>
+          </a:lnRef>
+          <a:fillRef idx="1">
+            <a:schemeClr val="accent1"/>
+          </a:fillRef>
+          <a:effectRef idx="0">
+            <a:srgbClr val="FFFFFF"/>
+          </a:effectRef>
+          <a:fontRef idx="minor">
+            <a:schemeClr val="lt1"/>
+          </a:fontRef>
+        </p:style>
+        <p:txBody>
+          <a:bodyPr rtlCol="0" anchor="ctr"/>
+          <a:p>
+            <a:pPr algn="ctr"/>
+            <a:endParaRPr lang="zh-CN" altLang="en-US"/>
+          </a:p>
+        </p:txBody>
+      </p:sp>
+      <p:pic>
+        <p:nvPicPr>
+          <p:cNvPr id="7" name="内容占位符 6" descr="R"/>
+          <p:cNvPicPr>
+            <a:picLocks noChangeAspect="1"/>
+          </p:cNvPicPr>
+          <p:nvPr>
+            <p:ph idx="1"/>
+          </p:nvPr>
+        </p:nvPicPr>
+        <p:blipFill>
+          <a:blip r:embed="rId1"/>
+          <a:srcRect r="-154" b="29359"/>
+          <a:stretch>
+            <a:fillRect/>
+          </a:stretch>
+        </p:blipFill>
+        <p:spPr>
+          <a:xfrm>
+            <a:off x="2452370" y="397510"/>
+            <a:ext cx="7021195" cy="5788025"/>
+          </a:xfrm>
+          <a:prstGeom prst="rect">
+            <a:avLst/>
+          </a:prstGeom>
+        </p:spPr>
+      </p:pic>
+    </p:spTree>
+  </p:cSld>
+  <p:clrMapOvr>
+    <a:masterClrMapping/>
+  </p:clrMapOvr>
+</p:sld>
+</file>
+
+<file path=ppt/slides/slide4.xml><?xml version="1.0" encoding="utf-8"?>
+<p:sld xmlns:a="http://schemas.openxmlformats.org/drawingml/2006/main" xmlns:r="http://schemas.openxmlformats.org/officeDocument/2006/relationships" xmlns:p="http://schemas.openxmlformats.org/presentationml/2006/main">
+  <p:cSld>
+    <p:spTree>
+      <p:nvGrpSpPr>
+        <p:cNvPr id="1" name=""/>
+        <p:cNvGrpSpPr/>
+        <p:nvPr/>
+      </p:nvGrpSpPr>
+      <p:grpSpPr/>
       <p:pic>
         <p:nvPicPr>
           <p:cNvPr id="8" name="内容占位符 7"/>
@@ -3957,7 +4066,7 @@
 </p:sld>
 </file>
 
-<file path=ppt/slides/slide4.xml><?xml version="1.0" encoding="utf-8"?>
+<file path=ppt/slides/slide5.xml><?xml version="1.0" encoding="utf-8"?>
 <p:sld xmlns:a="http://schemas.openxmlformats.org/drawingml/2006/main" xmlns:r="http://schemas.openxmlformats.org/officeDocument/2006/relationships" xmlns:p="http://schemas.openxmlformats.org/presentationml/2006/main">
   <p:cSld>
     <p:spTree>
@@ -4022,7 +4131,7 @@
 </p:sld>
 </file>
 
-<file path=ppt/slides/slide5.xml><?xml version="1.0" encoding="utf-8"?>
+<file path=ppt/slides/slide6.xml><?xml version="1.0" encoding="utf-8"?>
 <p:sld xmlns:a="http://schemas.openxmlformats.org/drawingml/2006/main" xmlns:r="http://schemas.openxmlformats.org/officeDocument/2006/relationships" xmlns:p="http://schemas.openxmlformats.org/presentationml/2006/main">
   <p:cSld>
     <p:spTree>
@@ -4565,7 +4674,7 @@
 </p:sld>
 </file>
 
-<file path=ppt/slides/slide6.xml><?xml version="1.0" encoding="utf-8"?>
+<file path=ppt/slides/slide7.xml><?xml version="1.0" encoding="utf-8"?>
 <p:sld xmlns:a="http://schemas.openxmlformats.org/drawingml/2006/main" xmlns:r="http://schemas.openxmlformats.org/officeDocument/2006/relationships" xmlns:p="http://schemas.openxmlformats.org/presentationml/2006/main">
   <p:cSld>
     <p:spTree>

</xml_diff>